<commit_message>
fix fitness calculation error
</commit_message>
<xml_diff>
--- a/reading/ecotypic_variation_hawkdove_9Jan2020.pptx
+++ b/reading/ecotypic_variation_hawkdove_9Jan2020.pptx
@@ -204,7 +204,7 @@
           <a:p>
             <a:fld id="{B362BDB9-F81E-564D-901F-59B3760C536E}" type="datetimeFigureOut">
               <a:rPr lang="en-US" smtClean="0"/>
-              <a:t>1/13/20</a:t>
+              <a:t>1/17/20</a:t>
             </a:fld>
             <a:endParaRPr lang="en-US"/>
           </a:p>
@@ -702,7 +702,7 @@
           <a:p>
             <a:fld id="{14616029-4282-8349-9BAC-B5879F536BA2}" type="datetimeFigureOut">
               <a:rPr lang="en-US" smtClean="0"/>
-              <a:t>1/13/20</a:t>
+              <a:t>1/17/20</a:t>
             </a:fld>
             <a:endParaRPr lang="en-US"/>
           </a:p>
@@ -900,7 +900,7 @@
           <a:p>
             <a:fld id="{14616029-4282-8349-9BAC-B5879F536BA2}" type="datetimeFigureOut">
               <a:rPr lang="en-US" smtClean="0"/>
-              <a:t>1/13/20</a:t>
+              <a:t>1/17/20</a:t>
             </a:fld>
             <a:endParaRPr lang="en-US"/>
           </a:p>
@@ -1108,7 +1108,7 @@
           <a:p>
             <a:fld id="{14616029-4282-8349-9BAC-B5879F536BA2}" type="datetimeFigureOut">
               <a:rPr lang="en-US" smtClean="0"/>
-              <a:t>1/13/20</a:t>
+              <a:t>1/17/20</a:t>
             </a:fld>
             <a:endParaRPr lang="en-US"/>
           </a:p>
@@ -1306,7 +1306,7 @@
           <a:p>
             <a:fld id="{14616029-4282-8349-9BAC-B5879F536BA2}" type="datetimeFigureOut">
               <a:rPr lang="en-US" smtClean="0"/>
-              <a:t>1/13/20</a:t>
+              <a:t>1/17/20</a:t>
             </a:fld>
             <a:endParaRPr lang="en-US"/>
           </a:p>
@@ -1581,7 +1581,7 @@
           <a:p>
             <a:fld id="{14616029-4282-8349-9BAC-B5879F536BA2}" type="datetimeFigureOut">
               <a:rPr lang="en-US" smtClean="0"/>
-              <a:t>1/13/20</a:t>
+              <a:t>1/17/20</a:t>
             </a:fld>
             <a:endParaRPr lang="en-US"/>
           </a:p>
@@ -1846,7 +1846,7 @@
           <a:p>
             <a:fld id="{14616029-4282-8349-9BAC-B5879F536BA2}" type="datetimeFigureOut">
               <a:rPr lang="en-US" smtClean="0"/>
-              <a:t>1/13/20</a:t>
+              <a:t>1/17/20</a:t>
             </a:fld>
             <a:endParaRPr lang="en-US"/>
           </a:p>
@@ -2258,7 +2258,7 @@
           <a:p>
             <a:fld id="{14616029-4282-8349-9BAC-B5879F536BA2}" type="datetimeFigureOut">
               <a:rPr lang="en-US" smtClean="0"/>
-              <a:t>1/13/20</a:t>
+              <a:t>1/17/20</a:t>
             </a:fld>
             <a:endParaRPr lang="en-US"/>
           </a:p>
@@ -2399,7 +2399,7 @@
           <a:p>
             <a:fld id="{14616029-4282-8349-9BAC-B5879F536BA2}" type="datetimeFigureOut">
               <a:rPr lang="en-US" smtClean="0"/>
-              <a:t>1/13/20</a:t>
+              <a:t>1/17/20</a:t>
             </a:fld>
             <a:endParaRPr lang="en-US"/>
           </a:p>
@@ -2512,7 +2512,7 @@
           <a:p>
             <a:fld id="{14616029-4282-8349-9BAC-B5879F536BA2}" type="datetimeFigureOut">
               <a:rPr lang="en-US" smtClean="0"/>
-              <a:t>1/13/20</a:t>
+              <a:t>1/17/20</a:t>
             </a:fld>
             <a:endParaRPr lang="en-US"/>
           </a:p>
@@ -2823,7 +2823,7 @@
           <a:p>
             <a:fld id="{14616029-4282-8349-9BAC-B5879F536BA2}" type="datetimeFigureOut">
               <a:rPr lang="en-US" smtClean="0"/>
-              <a:t>1/13/20</a:t>
+              <a:t>1/17/20</a:t>
             </a:fld>
             <a:endParaRPr lang="en-US"/>
           </a:p>
@@ -3111,7 +3111,7 @@
           <a:p>
             <a:fld id="{14616029-4282-8349-9BAC-B5879F536BA2}" type="datetimeFigureOut">
               <a:rPr lang="en-US" smtClean="0"/>
-              <a:t>1/13/20</a:t>
+              <a:t>1/17/20</a:t>
             </a:fld>
             <a:endParaRPr lang="en-US"/>
           </a:p>
@@ -3352,7 +3352,7 @@
           <a:p>
             <a:fld id="{14616029-4282-8349-9BAC-B5879F536BA2}" type="datetimeFigureOut">
               <a:rPr lang="en-US" smtClean="0"/>
-              <a:t>1/13/20</a:t>
+              <a:t>1/17/20</a:t>
             </a:fld>
             <a:endParaRPr lang="en-US"/>
           </a:p>
@@ -3846,8 +3846,20 @@
           </a:p>
           <a:p>
             <a:r>
-              <a:rPr lang="en-US" dirty="0"/>
-              <a:t>9 January 2020</a:t>
+              <a:rPr lang="en-US"/>
+              <a:t>1</a:t>
+            </a:r>
+            <a:r>
+              <a:rPr lang="en-US" dirty="0"/>
+              <a:t>7</a:t>
+            </a:r>
+            <a:r>
+              <a:rPr lang="en-US"/>
+              <a:t> </a:t>
+            </a:r>
+            <a:r>
+              <a:rPr lang="en-US" dirty="0"/>
+              <a:t>January 2020</a:t>
             </a:r>
           </a:p>
         </p:txBody>

</xml_diff>